<commit_message>
Add new fig exception_handling.pdf
</commit_message>
<xml_diff>
--- a/figs/rusty-bmc.pptx
+++ b/figs/rusty-bmc.pptx
@@ -107,6 +107,11 @@
       </a:defRPr>
     </a:lvl9pPr>
   </p:defaultTextStyle>
+  <p:extLst>
+    <p:ext uri="{EFAFB233-063F-42B5-8137-9DF3F51BA10A}">
+      <p15:sldGuideLst xmlns:p15="http://schemas.microsoft.com/office/powerpoint/2012/main"/>
+    </p:ext>
+  </p:extLst>
 </p:presentation>
 </file>
 
@@ -192,7 +197,7 @@
           <a:p>
             <a:fld id="{33560D31-4089-B745-9C90-4BE948E0B3C0}" type="datetimeFigureOut">
               <a:rPr lang="en-US" smtClean="0"/>
-              <a:t>4/16/24</a:t>
+              <a:t>4/17/24</a:t>
             </a:fld>
             <a:endParaRPr lang="en-US"/>
           </a:p>
@@ -679,7 +684,7 @@
           <a:p>
             <a:fld id="{2DA5BF39-07AD-FB4D-AFB6-A5FFDC3873D0}" type="datetimeFigureOut">
               <a:rPr lang="en-US" smtClean="0"/>
-              <a:t>4/16/24</a:t>
+              <a:t>4/17/24</a:t>
             </a:fld>
             <a:endParaRPr lang="en-US"/>
           </a:p>
@@ -849,7 +854,7 @@
           <a:p>
             <a:fld id="{2DA5BF39-07AD-FB4D-AFB6-A5FFDC3873D0}" type="datetimeFigureOut">
               <a:rPr lang="en-US" smtClean="0"/>
-              <a:t>4/16/24</a:t>
+              <a:t>4/17/24</a:t>
             </a:fld>
             <a:endParaRPr lang="en-US"/>
           </a:p>
@@ -1029,7 +1034,7 @@
           <a:p>
             <a:fld id="{2DA5BF39-07AD-FB4D-AFB6-A5FFDC3873D0}" type="datetimeFigureOut">
               <a:rPr lang="en-US" smtClean="0"/>
-              <a:t>4/16/24</a:t>
+              <a:t>4/17/24</a:t>
             </a:fld>
             <a:endParaRPr lang="en-US"/>
           </a:p>
@@ -1199,7 +1204,7 @@
           <a:p>
             <a:fld id="{2DA5BF39-07AD-FB4D-AFB6-A5FFDC3873D0}" type="datetimeFigureOut">
               <a:rPr lang="en-US" smtClean="0"/>
-              <a:t>4/16/24</a:t>
+              <a:t>4/17/24</a:t>
             </a:fld>
             <a:endParaRPr lang="en-US"/>
           </a:p>
@@ -1445,7 +1450,7 @@
           <a:p>
             <a:fld id="{2DA5BF39-07AD-FB4D-AFB6-A5FFDC3873D0}" type="datetimeFigureOut">
               <a:rPr lang="en-US" smtClean="0"/>
-              <a:t>4/16/24</a:t>
+              <a:t>4/17/24</a:t>
             </a:fld>
             <a:endParaRPr lang="en-US"/>
           </a:p>
@@ -1677,7 +1682,7 @@
           <a:p>
             <a:fld id="{2DA5BF39-07AD-FB4D-AFB6-A5FFDC3873D0}" type="datetimeFigureOut">
               <a:rPr lang="en-US" smtClean="0"/>
-              <a:t>4/16/24</a:t>
+              <a:t>4/17/24</a:t>
             </a:fld>
             <a:endParaRPr lang="en-US"/>
           </a:p>
@@ -2044,7 +2049,7 @@
           <a:p>
             <a:fld id="{2DA5BF39-07AD-FB4D-AFB6-A5FFDC3873D0}" type="datetimeFigureOut">
               <a:rPr lang="en-US" smtClean="0"/>
-              <a:t>4/16/24</a:t>
+              <a:t>4/17/24</a:t>
             </a:fld>
             <a:endParaRPr lang="en-US"/>
           </a:p>
@@ -2162,7 +2167,7 @@
           <a:p>
             <a:fld id="{2DA5BF39-07AD-FB4D-AFB6-A5FFDC3873D0}" type="datetimeFigureOut">
               <a:rPr lang="en-US" smtClean="0"/>
-              <a:t>4/16/24</a:t>
+              <a:t>4/17/24</a:t>
             </a:fld>
             <a:endParaRPr lang="en-US"/>
           </a:p>
@@ -2257,7 +2262,7 @@
           <a:p>
             <a:fld id="{2DA5BF39-07AD-FB4D-AFB6-A5FFDC3873D0}" type="datetimeFigureOut">
               <a:rPr lang="en-US" smtClean="0"/>
-              <a:t>4/16/24</a:t>
+              <a:t>4/17/24</a:t>
             </a:fld>
             <a:endParaRPr lang="en-US"/>
           </a:p>
@@ -2534,7 +2539,7 @@
           <a:p>
             <a:fld id="{2DA5BF39-07AD-FB4D-AFB6-A5FFDC3873D0}" type="datetimeFigureOut">
               <a:rPr lang="en-US" smtClean="0"/>
-              <a:t>4/16/24</a:t>
+              <a:t>4/17/24</a:t>
             </a:fld>
             <a:endParaRPr lang="en-US"/>
           </a:p>
@@ -2791,7 +2796,7 @@
           <a:p>
             <a:fld id="{2DA5BF39-07AD-FB4D-AFB6-A5FFDC3873D0}" type="datetimeFigureOut">
               <a:rPr lang="en-US" smtClean="0"/>
-              <a:t>4/16/24</a:t>
+              <a:t>4/17/24</a:t>
             </a:fld>
             <a:endParaRPr lang="en-US"/>
           </a:p>
@@ -3004,7 +3009,7 @@
           <a:p>
             <a:fld id="{2DA5BF39-07AD-FB4D-AFB6-A5FFDC3873D0}" type="datetimeFigureOut">
               <a:rPr lang="en-US" smtClean="0"/>
-              <a:t>4/16/24</a:t>
+              <a:t>4/17/24</a:t>
             </a:fld>
             <a:endParaRPr lang="en-US"/>
           </a:p>

</xml_diff>

<commit_message>
Fix a typo for rusty-bmc
</commit_message>
<xml_diff>
--- a/figs/rusty-bmc.pptx
+++ b/figs/rusty-bmc.pptx
@@ -3507,10 +3507,10 @@
       </p:grpSpPr>
       <p:grpSp>
         <p:nvGrpSpPr>
-          <p:cNvPr id="15" name="Group 14">
+          <p:cNvPr id="16" name="Group 15">
             <a:extLst>
               <a:ext uri="{FF2B5EF4-FFF2-40B4-BE49-F238E27FC236}">
-                <a16:creationId xmlns:a16="http://schemas.microsoft.com/office/drawing/2014/main" id="{6EABCC93-B080-E8D5-4293-F6EFD21832D1}"/>
+                <a16:creationId xmlns:a16="http://schemas.microsoft.com/office/drawing/2014/main" id="{50515586-61E2-5171-89B9-8131893FF13F}"/>
               </a:ext>
             </a:extLst>
           </p:cNvPr>
@@ -7240,7 +7240,7 @@
                   </a:solidFill>
                   <a:latin typeface="Times" pitchFamily="2" charset="0"/>
                 </a:rPr>
-                <a:t>   ) are aiming to minimize the number of jump instructions due to verifier's specific restrictions regarding these instructions. However, in the Rex, such checks have become redundant because the inherent feature of slice could help confine </a:t>
+                <a:t>   ) are aiming to minimize the number of jump instructions due to verifier‘s specific restrictions regarding these instructions. However, in the Rex, such checks have become redundant because the inherent feature of slice could help confine </a:t>
               </a:r>
               <a:r>
                 <a:rPr lang="en-US" sz="1602" dirty="0" err="1">
@@ -7276,7 +7276,25 @@
                   </a:solidFill>
                   <a:latin typeface="Times" pitchFamily="2" charset="0"/>
                 </a:rPr>
-                <a:t>  ).</a:t>
+                <a:t>  </a:t>
+              </a:r>
+              <a:r>
+                <a:rPr lang="zh-CN" altLang="en-US" sz="1602" dirty="0">
+                  <a:solidFill>
+                    <a:schemeClr val="tx1"/>
+                  </a:solidFill>
+                  <a:latin typeface="Times" pitchFamily="2" charset="0"/>
+                </a:rPr>
+                <a:t> </a:t>
+              </a:r>
+              <a:r>
+                <a:rPr lang="en-US" sz="1602" dirty="0">
+                  <a:solidFill>
+                    <a:schemeClr val="tx1"/>
+                  </a:solidFill>
+                  <a:latin typeface="Times" pitchFamily="2" charset="0"/>
+                </a:rPr>
+                <a:t>).</a:t>
               </a:r>
             </a:p>
             <a:p>
@@ -7617,6 +7635,52 @@
           <p:spPr>
             <a:xfrm>
               <a:off x="4488254" y="5124169"/>
+              <a:ext cx="115614" cy="190140"/>
+            </a:xfrm>
+            <a:prstGeom prst="rect">
+              <a:avLst/>
+            </a:prstGeom>
+          </p:spPr>
+          <p:style>
+            <a:lnRef idx="2">
+              <a:schemeClr val="accent1">
+                <a:shade val="50000"/>
+              </a:schemeClr>
+            </a:lnRef>
+            <a:fillRef idx="1">
+              <a:schemeClr val="accent1"/>
+            </a:fillRef>
+            <a:effectRef idx="0">
+              <a:schemeClr val="accent1"/>
+            </a:effectRef>
+            <a:fontRef idx="minor">
+              <a:schemeClr val="lt1"/>
+            </a:fontRef>
+          </p:style>
+          <p:txBody>
+            <a:bodyPr rtlCol="0" anchor="ctr"/>
+            <a:lstStyle/>
+            <a:p>
+              <a:pPr algn="ctr"/>
+              <a:endParaRPr lang="en-US" sz="600"/>
+            </a:p>
+          </p:txBody>
+        </p:sp>
+        <p:sp>
+          <p:nvSpPr>
+            <p:cNvPr id="6" name="Rectangle 5">
+              <a:extLst>
+                <a:ext uri="{FF2B5EF4-FFF2-40B4-BE49-F238E27FC236}">
+                  <a16:creationId xmlns:a16="http://schemas.microsoft.com/office/drawing/2014/main" id="{44266469-C13D-5E08-BE9E-1F78A4FD963A}"/>
+                </a:ext>
+              </a:extLst>
+            </p:cNvPr>
+            <p:cNvSpPr/>
+            <p:nvPr/>
+          </p:nvSpPr>
+          <p:spPr>
+            <a:xfrm>
+              <a:off x="6571593" y="4873780"/>
               <a:ext cx="115614" cy="190140"/>
             </a:xfrm>
             <a:prstGeom prst="rect">

</xml_diff>